<commit_message>
adding new presentation slides
</commit_message>
<xml_diff>
--- a/Presentation/nba_player_salaries.pptx
+++ b/Presentation/nba_player_salaries.pptx
@@ -5,17 +5,18 @@
     <p:sldMasterId id="2147483659" r:id="rId1"/>
   </p:sldMasterIdLst>
   <p:notesMasterIdLst>
-    <p:notesMasterId r:id="rId10"/>
+    <p:notesMasterId r:id="rId11"/>
   </p:notesMasterIdLst>
   <p:sldIdLst>
     <p:sldId id="256" r:id="rId2"/>
     <p:sldId id="257" r:id="rId3"/>
     <p:sldId id="258" r:id="rId4"/>
-    <p:sldId id="259" r:id="rId5"/>
+    <p:sldId id="263" r:id="rId5"/>
     <p:sldId id="260" r:id="rId6"/>
-    <p:sldId id="261" r:id="rId7"/>
+    <p:sldId id="259" r:id="rId7"/>
     <p:sldId id="262" r:id="rId8"/>
     <p:sldId id="264" r:id="rId9"/>
+    <p:sldId id="266" r:id="rId10"/>
   </p:sldIdLst>
   <p:sldSz cx="9144000" cy="5143500" type="screen16x9"/>
   <p:notesSz cx="6858000" cy="9144000"/>
@@ -841,7 +842,7 @@
         </p:nvSpPr>
         <p:spPr>
           <a:xfrm>
-            <a:off x="381300" y="685800"/>
+            <a:off x="381000" y="685800"/>
             <a:ext cx="6096000" cy="3429000"/>
           </a:xfrm>
           <a:custGeom>
@@ -904,7 +905,7 @@
               </a:spcAft>
               <a:buNone/>
             </a:pPr>
-            <a:endParaRPr/>
+            <a:endParaRPr dirty="0"/>
           </a:p>
         </p:txBody>
       </p:sp>
@@ -1008,7 +1009,7 @@
               </a:spcAft>
               <a:buNone/>
             </a:pPr>
-            <a:endParaRPr dirty="0"/>
+            <a:endParaRPr/>
           </a:p>
         </p:txBody>
       </p:sp>
@@ -1021,11 +1022,11 @@
 </file>
 
 <file path=ppt/notesSlides/notesSlide4.xml><?xml version="1.0" encoding="utf-8"?>
-<p:notes xmlns:a="http://schemas.openxmlformats.org/drawingml/2006/main" xmlns:r="http://schemas.openxmlformats.org/officeDocument/2006/relationships" xmlns:p="http://schemas.openxmlformats.org/presentationml/2006/main" showMasterSp="0" showMasterPhAnim="0">
+<p:notes xmlns:a="http://schemas.openxmlformats.org/drawingml/2006/main" xmlns:r="http://schemas.openxmlformats.org/officeDocument/2006/relationships" xmlns:p="http://schemas.openxmlformats.org/presentationml/2006/main">
   <p:cSld>
     <p:spTree>
       <p:nvGrpSpPr>
-        <p:cNvPr id="1" name="Shape 149"/>
+        <p:cNvPr id="1" name=""/>
         <p:cNvGrpSpPr/>
         <p:nvPr/>
       </p:nvGrpSpPr>
@@ -1039,84 +1040,41 @@
       </p:grpSpPr>
       <p:sp>
         <p:nvSpPr>
-          <p:cNvPr id="150" name="Google Shape;150;ge523c73776_0_3193:notes"/>
+          <p:cNvPr id="2" name="Slide Image Placeholder 1"/>
           <p:cNvSpPr>
             <a:spLocks noGrp="1" noRot="1" noChangeAspect="1"/>
           </p:cNvSpPr>
           <p:nvPr>
-            <p:ph type="sldImg" idx="2"/>
+            <p:ph type="sldImg"/>
           </p:nvPr>
         </p:nvSpPr>
-        <p:spPr>
-          <a:xfrm>
-            <a:off x="381300" y="685800"/>
-            <a:ext cx="6096000" cy="3429000"/>
-          </a:xfrm>
-          <a:custGeom>
-            <a:avLst/>
-            <a:gdLst/>
-            <a:ahLst/>
-            <a:cxnLst/>
-            <a:rect l="l" t="t" r="r" b="b"/>
-            <a:pathLst>
-              <a:path w="120000" h="120000" extrusionOk="0">
-                <a:moveTo>
-                  <a:pt x="0" y="0"/>
-                </a:moveTo>
-                <a:lnTo>
-                  <a:pt x="120000" y="0"/>
-                </a:lnTo>
-                <a:lnTo>
-                  <a:pt x="120000" y="120000"/>
-                </a:lnTo>
-                <a:lnTo>
-                  <a:pt x="0" y="120000"/>
-                </a:lnTo>
-                <a:close/>
-              </a:path>
-            </a:pathLst>
-          </a:custGeom>
-        </p:spPr>
+        <p:spPr/>
       </p:sp>
       <p:sp>
         <p:nvSpPr>
-          <p:cNvPr id="151" name="Google Shape;151;ge523c73776_0_3193:notes"/>
-          <p:cNvSpPr txBox="1">
+          <p:cNvPr id="3" name="Notes Placeholder 2"/>
+          <p:cNvSpPr>
             <a:spLocks noGrp="1"/>
           </p:cNvSpPr>
           <p:nvPr>
             <p:ph type="body" idx="1"/>
           </p:nvPr>
         </p:nvSpPr>
-        <p:spPr>
-          <a:xfrm>
-            <a:off x="685800" y="4343400"/>
-            <a:ext cx="5486400" cy="4114800"/>
-          </a:xfrm>
-          <a:prstGeom prst="rect">
-            <a:avLst/>
-          </a:prstGeom>
-        </p:spPr>
+        <p:spPr/>
         <p:txBody>
-          <a:bodyPr spcFirstLastPara="1" wrap="square" lIns="91425" tIns="91425" rIns="91425" bIns="91425" anchor="t" anchorCtr="0">
-            <a:noAutofit/>
-          </a:bodyPr>
+          <a:bodyPr/>
           <a:lstStyle/>
           <a:p>
-            <a:pPr marL="0" lvl="0" indent="0" algn="l" rtl="0">
-              <a:spcBef>
-                <a:spcPts val="0"/>
-              </a:spcBef>
-              <a:spcAft>
-                <a:spcPts val="0"/>
-              </a:spcAft>
-              <a:buNone/>
-            </a:pPr>
-            <a:endParaRPr/>
+            <a:endParaRPr lang="en-US" dirty="0"/>
           </a:p>
         </p:txBody>
       </p:sp>
     </p:spTree>
+    <p:extLst>
+      <p:ext uri="{BB962C8B-B14F-4D97-AF65-F5344CB8AC3E}">
+        <p14:creationId xmlns:p14="http://schemas.microsoft.com/office/powerpoint/2010/main" val="4208298714"/>
+      </p:ext>
+    </p:extLst>
   </p:cSld>
   <p:clrMapOvr>
     <a:masterClrMapping/>
@@ -1216,7 +1174,7 @@
               </a:spcAft>
               <a:buNone/>
             </a:pPr>
-            <a:endParaRPr/>
+            <a:endParaRPr dirty="0"/>
           </a:p>
         </p:txBody>
       </p:sp>
@@ -1233,7 +1191,7 @@
   <p:cSld>
     <p:spTree>
       <p:nvGrpSpPr>
-        <p:cNvPr id="1" name="Shape 161"/>
+        <p:cNvPr id="1" name="Shape 149"/>
         <p:cNvGrpSpPr/>
         <p:nvPr/>
       </p:nvGrpSpPr>
@@ -1247,7 +1205,7 @@
       </p:grpSpPr>
       <p:sp>
         <p:nvSpPr>
-          <p:cNvPr id="162" name="Google Shape;162;ge523c73776_0_3208:notes"/>
+          <p:cNvPr id="150" name="Google Shape;150;ge523c73776_0_3193:notes"/>
           <p:cNvSpPr>
             <a:spLocks noGrp="1" noRot="1" noChangeAspect="1"/>
           </p:cNvSpPr>
@@ -1288,7 +1246,7 @@
       </p:sp>
       <p:sp>
         <p:nvSpPr>
-          <p:cNvPr id="163" name="Google Shape;163;ge523c73776_0_3208:notes"/>
+          <p:cNvPr id="151" name="Google Shape;151;ge523c73776_0_3193:notes"/>
           <p:cNvSpPr txBox="1">
             <a:spLocks noGrp="1"/>
           </p:cNvSpPr>
@@ -1325,6 +1283,126 @@
         </p:txBody>
       </p:sp>
     </p:spTree>
+  </p:cSld>
+  <p:clrMapOvr>
+    <a:masterClrMapping/>
+  </p:clrMapOvr>
+</p:notes>
+</file>
+
+<file path=ppt/notesSlides/notesSlide7.xml><?xml version="1.0" encoding="utf-8"?>
+<p:notes xmlns:a="http://schemas.openxmlformats.org/drawingml/2006/main" xmlns:r="http://schemas.openxmlformats.org/officeDocument/2006/relationships" xmlns:p="http://schemas.openxmlformats.org/presentationml/2006/main">
+  <p:cSld>
+    <p:spTree>
+      <p:nvGrpSpPr>
+        <p:cNvPr id="1" name=""/>
+        <p:cNvGrpSpPr/>
+        <p:nvPr/>
+      </p:nvGrpSpPr>
+      <p:grpSpPr>
+        <a:xfrm>
+          <a:off x="0" y="0"/>
+          <a:ext cx="0" cy="0"/>
+          <a:chOff x="0" y="0"/>
+          <a:chExt cx="0" cy="0"/>
+        </a:xfrm>
+      </p:grpSpPr>
+      <p:sp>
+        <p:nvSpPr>
+          <p:cNvPr id="2" name="Slide Image Placeholder 1"/>
+          <p:cNvSpPr>
+            <a:spLocks noGrp="1" noRot="1" noChangeAspect="1"/>
+          </p:cNvSpPr>
+          <p:nvPr>
+            <p:ph type="sldImg"/>
+          </p:nvPr>
+        </p:nvSpPr>
+        <p:spPr>
+          <a:xfrm>
+            <a:off x="381000" y="685800"/>
+            <a:ext cx="6096000" cy="3429000"/>
+          </a:xfrm>
+        </p:spPr>
+      </p:sp>
+      <p:sp>
+        <p:nvSpPr>
+          <p:cNvPr id="3" name="Notes Placeholder 2"/>
+          <p:cNvSpPr>
+            <a:spLocks noGrp="1"/>
+          </p:cNvSpPr>
+          <p:nvPr>
+            <p:ph type="body" idx="1"/>
+          </p:nvPr>
+        </p:nvSpPr>
+        <p:spPr/>
+        <p:txBody>
+          <a:bodyPr/>
+          <a:lstStyle/>
+          <a:p>
+            <a:pPr marL="158750" lvl="0" indent="0">
+              <a:buNone/>
+            </a:pPr>
+            <a:r>
+              <a:rPr lang="en-US" b="1" dirty="0" smtClean="0"/>
+              <a:t>To</a:t>
+            </a:r>
+            <a:r>
+              <a:rPr lang="en-US" b="1" baseline="0" dirty="0" smtClean="0"/>
+              <a:t> be done for deliverable 4: </a:t>
+            </a:r>
+          </a:p>
+          <a:p>
+            <a:pPr marL="457200" lvl="0" indent="-298450">
+              <a:buFontTx/>
+              <a:buChar char="-"/>
+            </a:pPr>
+            <a:r>
+              <a:rPr lang="en-US" b="0" baseline="0" dirty="0" smtClean="0"/>
+              <a:t>interpret/explain what the scores mean (can either go into detail for each or not, but essentially the model was not very good at predicting) </a:t>
+            </a:r>
+          </a:p>
+          <a:p>
+            <a:pPr marL="457200" lvl="0" indent="-298450">
+              <a:buFontTx/>
+              <a:buChar char="-"/>
+            </a:pPr>
+            <a:endParaRPr lang="en-US" b="0" baseline="0" dirty="0" smtClean="0"/>
+          </a:p>
+          <a:p>
+            <a:pPr marL="457200" lvl="0" indent="-298450">
+              <a:buFontTx/>
+              <a:buChar char="-"/>
+            </a:pPr>
+            <a:r>
+              <a:rPr lang="en-US" b="0" baseline="0" dirty="0" smtClean="0"/>
+              <a:t>Explain the ranking of features (maybe add Dean’s visualizations here) we can see that each feature individually doesn’t have much of an impact, therefore other factors might come into play, though the top ranking features are what we’d expect, the longer you play the higher your salary is as indicated by year, age and games. PER = player efficiency rating and WS = win share are also near the top which are usually stats which track player performance as a whole and wins added so those are good metrics to measure/indicate that better/winning players tend to be paid more </a:t>
+            </a:r>
+          </a:p>
+          <a:p>
+            <a:pPr marL="457200" lvl="0" indent="-298450">
+              <a:buFontTx/>
+              <a:buChar char="-"/>
+            </a:pPr>
+            <a:endParaRPr lang="en-US" b="0" baseline="0" dirty="0"/>
+          </a:p>
+          <a:p>
+            <a:pPr marL="457200" lvl="0" indent="-298450">
+              <a:buFontTx/>
+              <a:buChar char="-"/>
+            </a:pPr>
+            <a:r>
+              <a:rPr lang="en-US" b="0" baseline="0" dirty="0" smtClean="0"/>
+              <a:t>Explain that we went from a linear model (not insightful since it was a blob) to Random Forest (to try and improve predictions and determine importance of features; which we see isn’t accurate either) to Deep learning  model</a:t>
+            </a:r>
+          </a:p>
+        </p:txBody>
+      </p:sp>
+    </p:spTree>
+    <p:extLst>
+      <p:ext uri="{BB962C8B-B14F-4D97-AF65-F5344CB8AC3E}">
+        <p14:creationId xmlns:p14="http://schemas.microsoft.com/office/powerpoint/2010/main" val="3629830623"/>
+      </p:ext>
+    </p:extLst>
   </p:cSld>
   <p:clrMapOvr>
     <a:masterClrMapping/>
@@ -9624,10 +9702,14 @@
               <a:buNone/>
             </a:pPr>
             <a:r>
-              <a:rPr lang="en"/>
-              <a:t>Page 3 - Introduction</a:t>
+              <a:rPr lang="en" dirty="0"/>
+              <a:t>Page </a:t>
             </a:r>
-            <a:endParaRPr/>
+            <a:r>
+              <a:rPr lang="en" dirty="0" smtClean="0"/>
+              <a:t>3 to 4 – Introduction</a:t>
+            </a:r>
+            <a:endParaRPr dirty="0"/>
           </a:p>
           <a:p>
             <a:pPr marL="0" lvl="0" indent="0" algn="l" rtl="0">
@@ -9640,10 +9722,30 @@
               <a:buNone/>
             </a:pPr>
             <a:r>
-              <a:rPr lang="en"/>
-              <a:t>Page 4 -  Source of Data</a:t>
+              <a:rPr lang="en" dirty="0"/>
+              <a:t>Page </a:t>
             </a:r>
-            <a:endParaRPr/>
+            <a:r>
+              <a:rPr lang="en" dirty="0" smtClean="0"/>
+              <a:t>5 to 6</a:t>
+            </a:r>
+            <a:r>
+              <a:rPr lang="en" dirty="0"/>
+              <a:t> </a:t>
+            </a:r>
+            <a:r>
+              <a:rPr lang="en" dirty="0" smtClean="0"/>
+              <a:t>– </a:t>
+            </a:r>
+            <a:r>
+              <a:rPr lang="en" dirty="0" smtClean="0"/>
+              <a:t>Source </a:t>
+            </a:r>
+            <a:r>
+              <a:rPr lang="en" dirty="0"/>
+              <a:t>of Data</a:t>
+            </a:r>
+            <a:endParaRPr dirty="0"/>
           </a:p>
           <a:p>
             <a:pPr marL="0" lvl="0" indent="0" algn="l" rtl="0">
@@ -9656,10 +9758,22 @@
               <a:buNone/>
             </a:pPr>
             <a:r>
-              <a:rPr lang="en"/>
-              <a:t>Page 5 - Description of the Data Exploration Phase</a:t>
+              <a:rPr lang="en" dirty="0"/>
+              <a:t>Page 5 </a:t>
             </a:r>
-            <a:endParaRPr/>
+            <a:r>
+              <a:rPr lang="en" dirty="0" smtClean="0"/>
+              <a:t>– </a:t>
+            </a:r>
+            <a:r>
+              <a:rPr lang="en" dirty="0" smtClean="0"/>
+              <a:t>Description </a:t>
+            </a:r>
+            <a:r>
+              <a:rPr lang="en" dirty="0"/>
+              <a:t>of the Data Exploration Phase</a:t>
+            </a:r>
+            <a:endParaRPr dirty="0"/>
           </a:p>
           <a:p>
             <a:pPr marL="0" lvl="0" indent="0" algn="l" rtl="0">
@@ -9672,10 +9786,21 @@
               <a:buNone/>
             </a:pPr>
             <a:r>
-              <a:rPr lang="en"/>
-              <a:t>Page 6 - Description of the Analysis Phase</a:t>
+              <a:rPr lang="en" dirty="0"/>
+              <a:t>Page 6 </a:t>
             </a:r>
-            <a:endParaRPr/>
+            <a:r>
+              <a:rPr lang="en" dirty="0" smtClean="0"/>
+              <a:t>– Description </a:t>
+            </a:r>
+            <a:r>
+              <a:rPr lang="en" dirty="0"/>
+              <a:t>of the Analysis </a:t>
+            </a:r>
+            <a:r>
+              <a:rPr lang="en" dirty="0" smtClean="0"/>
+              <a:t>Phase</a:t>
+            </a:r>
           </a:p>
           <a:p>
             <a:pPr marL="0" lvl="0" indent="0" algn="l" rtl="0">
@@ -9683,11 +9808,27 @@
                 <a:spcPts val="1200"/>
               </a:spcBef>
               <a:spcAft>
+                <a:spcPts val="0"/>
+              </a:spcAft>
+              <a:buNone/>
+            </a:pPr>
+            <a:r>
+              <a:rPr lang="en" dirty="0" smtClean="0"/>
+              <a:t>Page 7 – Tools used</a:t>
+            </a:r>
+            <a:endParaRPr dirty="0"/>
+          </a:p>
+          <a:p>
+            <a:pPr marL="0" lvl="0" indent="0" algn="l" rtl="0">
+              <a:spcBef>
                 <a:spcPts val="1200"/>
+              </a:spcBef>
+              <a:spcAft>
+                <a:spcPts val="1200"/>
               </a:spcAft>
               <a:buNone/>
             </a:pPr>
-            <a:endParaRPr/>
+            <a:endParaRPr dirty="0"/>
           </a:p>
         </p:txBody>
       </p:sp>
@@ -9752,7 +9893,7 @@
             </a:pPr>
             <a:r>
               <a:rPr lang="en" dirty="0" smtClean="0"/>
-              <a:t>Introduction</a:t>
+              <a:t>Introduction – Selected Topic</a:t>
             </a:r>
             <a:endParaRPr dirty="0"/>
           </a:p>
@@ -9795,28 +9936,6 @@
             <a:r>
               <a:rPr lang="en" dirty="0"/>
               <a:t>Basketball is a rapidly growing sport internationally. The National Basketball Association(NBA) is the league where the top paid and most sought after players play in. It was founded in New York City on June 6, 1946 and is currently the third wealthiest professional sports league in North America. Since 2020, the NBA has the highest average annual salary of all professional athletes in the world. </a:t>
-            </a:r>
-            <a:endParaRPr lang="en" dirty="0" smtClean="0"/>
-          </a:p>
-          <a:p>
-            <a:pPr marL="0" lvl="0" indent="0" algn="l" rtl="0">
-              <a:spcBef>
-                <a:spcPts val="0"/>
-              </a:spcBef>
-              <a:spcAft>
-                <a:spcPts val="0"/>
-              </a:spcAft>
-              <a:buNone/>
-            </a:pPr>
-            <a:endParaRPr lang="en" dirty="0"/>
-          </a:p>
-          <a:p>
-            <a:pPr marL="0" indent="0">
-              <a:buNone/>
-            </a:pPr>
-            <a:r>
-              <a:rPr lang="en-US" dirty="0"/>
-              <a:t>As a group we have a mix of interest in sports and finance. In order to accommodate and combine the interests, we decided to take a look at the finance side (i.e. salaries) of sports. </a:t>
             </a:r>
             <a:endParaRPr dirty="0"/>
           </a:p>
@@ -9904,6 +10023,45 @@
           </a:p>
         </p:txBody>
       </p:sp>
+      <p:pic>
+        <p:nvPicPr>
+          <p:cNvPr id="1030" name="Picture 6" descr="NBA Logo and its History | LogoMyWay"/>
+          <p:cNvPicPr>
+            <a:picLocks noChangeAspect="1" noChangeArrowheads="1"/>
+          </p:cNvPicPr>
+          <p:nvPr/>
+        </p:nvPicPr>
+        <p:blipFill rotWithShape="1">
+          <a:blip r:embed="rId3">
+            <a:extLst>
+              <a:ext uri="{28A0092B-C50C-407E-A947-70E740481C1C}">
+                <a14:useLocalDpi xmlns:a14="http://schemas.microsoft.com/office/drawing/2010/main" val="0"/>
+              </a:ext>
+            </a:extLst>
+          </a:blip>
+          <a:srcRect l="30130" t="2764" r="28988" b="3294"/>
+          <a:stretch/>
+        </p:blipFill>
+        <p:spPr bwMode="auto">
+          <a:xfrm>
+            <a:off x="0" y="3696909"/>
+            <a:ext cx="638629" cy="1446591"/>
+          </a:xfrm>
+          <a:prstGeom prst="rect">
+            <a:avLst/>
+          </a:prstGeom>
+          <a:noFill/>
+          <a:extLst>
+            <a:ext uri="{909E8E84-426E-40DD-AFC4-6F175D3DCCD1}">
+              <a14:hiddenFill xmlns:a14="http://schemas.microsoft.com/office/drawing/2010/main">
+                <a:solidFill>
+                  <a:srgbClr val="FFFFFF"/>
+                </a:solidFill>
+              </a14:hiddenFill>
+            </a:ext>
+          </a:extLst>
+        </p:spPr>
+      </p:pic>
     </p:spTree>
   </p:cSld>
   <p:clrMapOvr>
@@ -9917,7 +10075,7 @@
   <p:cSld>
     <p:spTree>
       <p:nvGrpSpPr>
-        <p:cNvPr id="1" name="Shape 152"/>
+        <p:cNvPr id="1" name=""/>
         <p:cNvGrpSpPr/>
         <p:nvPr/>
       </p:nvGrpSpPr>
@@ -9931,50 +10089,34 @@
       </p:grpSpPr>
       <p:sp>
         <p:nvSpPr>
-          <p:cNvPr id="153" name="Google Shape;153;p16"/>
-          <p:cNvSpPr txBox="1">
+          <p:cNvPr id="2" name="Title 1"/>
+          <p:cNvSpPr>
             <a:spLocks noGrp="1"/>
           </p:cNvSpPr>
           <p:nvPr>
             <p:ph type="title"/>
           </p:nvPr>
         </p:nvSpPr>
-        <p:spPr>
-          <a:xfrm>
-            <a:off x="1297500" y="393750"/>
-            <a:ext cx="7038900" cy="914100"/>
-          </a:xfrm>
-          <a:prstGeom prst="rect">
-            <a:avLst/>
-          </a:prstGeom>
-        </p:spPr>
+        <p:spPr/>
         <p:txBody>
-          <a:bodyPr spcFirstLastPara="1" wrap="square" lIns="91425" tIns="91425" rIns="91425" bIns="91425" anchor="t" anchorCtr="0">
+          <a:bodyPr>
             <a:normAutofit/>
           </a:bodyPr>
           <a:lstStyle/>
           <a:p>
-            <a:pPr marL="0" lvl="0" indent="0" algn="ctr" rtl="0">
-              <a:spcBef>
-                <a:spcPts val="0"/>
-              </a:spcBef>
-              <a:spcAft>
-                <a:spcPts val="0"/>
-              </a:spcAft>
-              <a:buNone/>
-            </a:pPr>
+            <a:pPr algn="ctr"/>
             <a:r>
-              <a:rPr lang="en"/>
-              <a:t>Source of Data</a:t>
+              <a:rPr lang="en-US" dirty="0" smtClean="0"/>
+              <a:t>Introduction – Topic &amp; Questions to Answer</a:t>
             </a:r>
-            <a:endParaRPr/>
+            <a:endParaRPr lang="en-US" dirty="0"/>
           </a:p>
         </p:txBody>
       </p:sp>
       <p:sp>
         <p:nvSpPr>
-          <p:cNvPr id="154" name="Google Shape;154;p16"/>
-          <p:cNvSpPr txBox="1">
+          <p:cNvPr id="3" name="Text Placeholder 2"/>
+          <p:cNvSpPr>
             <a:spLocks noGrp="1"/>
           </p:cNvSpPr>
           <p:nvPr>
@@ -9983,124 +10125,203 @@
         </p:nvSpPr>
         <p:spPr>
           <a:xfrm>
-            <a:off x="1297500" y="1567550"/>
+            <a:off x="1297500" y="1062670"/>
             <a:ext cx="7038900" cy="2911200"/>
+          </a:xfrm>
+        </p:spPr>
+        <p:txBody>
+          <a:bodyPr/>
+          <a:lstStyle/>
+          <a:p>
+            <a:pPr marL="146050" indent="0">
+              <a:buNone/>
+            </a:pPr>
+            <a:r>
+              <a:rPr lang="en-US" dirty="0" smtClean="0"/>
+              <a:t>As a group we have a mix of interest in sports and finance. In order to accommodate and combine the interests, we decided to take a look at the finance side (i.e. salaries) of </a:t>
+            </a:r>
+            <a:r>
+              <a:rPr lang="en-US" dirty="0" smtClean="0"/>
+              <a:t>sports</a:t>
+            </a:r>
+          </a:p>
+          <a:p>
+            <a:pPr marL="146050" indent="0">
+              <a:buNone/>
+            </a:pPr>
+            <a:endParaRPr lang="en-US" dirty="0" smtClean="0"/>
+          </a:p>
+          <a:p>
+            <a:pPr marL="146050" indent="0">
+              <a:buNone/>
+            </a:pPr>
+            <a:r>
+              <a:rPr lang="en-US" dirty="0"/>
+              <a:t>We will use the player’s statistics as the ‘features’ of our Machine Learning Model and the player's salary will be the ‘output’. The questions we are hoping to answer are: </a:t>
+            </a:r>
+          </a:p>
+          <a:p>
+            <a:r>
+              <a:rPr lang="en-US" dirty="0"/>
+              <a:t>“Can we predict a player’s salary based on their NBA statistics?”</a:t>
+            </a:r>
+          </a:p>
+          <a:p>
+            <a:r>
+              <a:rPr lang="en-US" dirty="0"/>
+              <a:t>“Do player statistics have an impact on salaries”</a:t>
+            </a:r>
+          </a:p>
+          <a:p>
+            <a:r>
+              <a:rPr lang="en-US" dirty="0"/>
+              <a:t>“If so, which statistics have a greater impact on salaries or are more impactful”</a:t>
+            </a:r>
+          </a:p>
+          <a:p>
+            <a:pPr marL="146050" indent="0">
+              <a:buNone/>
+            </a:pPr>
+            <a:endParaRPr lang="en-US" dirty="0"/>
+          </a:p>
+          <a:p>
+            <a:pPr marL="146050" indent="0">
+              <a:buNone/>
+            </a:pPr>
+            <a:r>
+              <a:rPr lang="en-US" dirty="0" smtClean="0"/>
+              <a:t> </a:t>
+            </a:r>
+            <a:endParaRPr lang="en-US" dirty="0"/>
+          </a:p>
+        </p:txBody>
+      </p:sp>
+      <p:pic>
+        <p:nvPicPr>
+          <p:cNvPr id="2050" name="Picture 2" descr="Mineral County has PVC Player, Coach of the Year, 8 on team"/>
+          <p:cNvPicPr>
+            <a:picLocks noChangeAspect="1" noChangeArrowheads="1"/>
+          </p:cNvPicPr>
+          <p:nvPr/>
+        </p:nvPicPr>
+        <p:blipFill rotWithShape="1">
+          <a:blip r:embed="rId3">
+            <a:extLst>
+              <a:ext uri="{28A0092B-C50C-407E-A947-70E740481C1C}">
+                <a14:useLocalDpi xmlns:a14="http://schemas.microsoft.com/office/drawing/2010/main" val="0"/>
+              </a:ext>
+            </a:extLst>
+          </a:blip>
+          <a:srcRect r="17217"/>
+          <a:stretch/>
+        </p:blipFill>
+        <p:spPr bwMode="auto">
+          <a:xfrm>
+            <a:off x="1297500" y="3205091"/>
+            <a:ext cx="2229471" cy="1517022"/>
           </a:xfrm>
           <a:prstGeom prst="rect">
             <a:avLst/>
           </a:prstGeom>
+          <a:noFill/>
+          <a:extLst>
+            <a:ext uri="{909E8E84-426E-40DD-AFC4-6F175D3DCCD1}">
+              <a14:hiddenFill xmlns:a14="http://schemas.microsoft.com/office/drawing/2010/main">
+                <a:solidFill>
+                  <a:srgbClr val="FFFFFF"/>
+                </a:solidFill>
+              </a14:hiddenFill>
+            </a:ext>
+          </a:extLst>
         </p:spPr>
+      </p:pic>
+      <p:pic>
+        <p:nvPicPr>
+          <p:cNvPr id="2052" name="Picture 4" descr="Difference Between MOU and Contract | Difference Between"/>
+          <p:cNvPicPr>
+            <a:picLocks noChangeAspect="1" noChangeArrowheads="1"/>
+          </p:cNvPicPr>
+          <p:nvPr/>
+        </p:nvPicPr>
+        <p:blipFill>
+          <a:blip r:embed="rId4">
+            <a:extLst>
+              <a:ext uri="{28A0092B-C50C-407E-A947-70E740481C1C}">
+                <a14:useLocalDpi xmlns:a14="http://schemas.microsoft.com/office/drawing/2010/main" val="0"/>
+              </a:ext>
+            </a:extLst>
+          </a:blip>
+          <a:srcRect/>
+          <a:stretch>
+            <a:fillRect/>
+          </a:stretch>
+        </p:blipFill>
+        <p:spPr bwMode="auto">
+          <a:xfrm>
+            <a:off x="6106929" y="3193521"/>
+            <a:ext cx="2229471" cy="1537557"/>
+          </a:xfrm>
+          <a:prstGeom prst="rect">
+            <a:avLst/>
+          </a:prstGeom>
+          <a:noFill/>
+          <a:extLst>
+            <a:ext uri="{909E8E84-426E-40DD-AFC4-6F175D3DCCD1}">
+              <a14:hiddenFill xmlns:a14="http://schemas.microsoft.com/office/drawing/2010/main">
+                <a:solidFill>
+                  <a:srgbClr val="FFFFFF"/>
+                </a:solidFill>
+              </a14:hiddenFill>
+            </a:ext>
+          </a:extLst>
+        </p:spPr>
+      </p:pic>
+      <p:sp>
+        <p:nvSpPr>
+          <p:cNvPr id="4" name="Right Arrow 3"/>
+          <p:cNvSpPr/>
+          <p:nvPr/>
+        </p:nvSpPr>
+        <p:spPr>
+          <a:xfrm>
+            <a:off x="4207350" y="3693785"/>
+            <a:ext cx="1219200" cy="537028"/>
+          </a:xfrm>
+          <a:prstGeom prst="rightArrow">
+            <a:avLst/>
+          </a:prstGeom>
+        </p:spPr>
+        <p:style>
+          <a:lnRef idx="2">
+            <a:schemeClr val="accent1">
+              <a:shade val="50000"/>
+            </a:schemeClr>
+          </a:lnRef>
+          <a:fillRef idx="1">
+            <a:schemeClr val="accent1"/>
+          </a:fillRef>
+          <a:effectRef idx="0">
+            <a:schemeClr val="accent1"/>
+          </a:effectRef>
+          <a:fontRef idx="minor">
+            <a:schemeClr val="lt1"/>
+          </a:fontRef>
+        </p:style>
         <p:txBody>
-          <a:bodyPr spcFirstLastPara="1" wrap="square" lIns="91425" tIns="91425" rIns="91425" bIns="91425" anchor="t" anchorCtr="0">
-            <a:normAutofit/>
-          </a:bodyPr>
+          <a:bodyPr rtlCol="0" anchor="ctr"/>
           <a:lstStyle/>
           <a:p>
-            <a:pPr marL="0" lvl="0" indent="0" algn="l" rtl="0">
-              <a:spcBef>
-                <a:spcPts val="0"/>
-              </a:spcBef>
-              <a:spcAft>
-                <a:spcPts val="0"/>
-              </a:spcAft>
-              <a:buNone/>
-            </a:pPr>
-            <a:r>
-              <a:rPr lang="en"/>
-              <a:t>Our datasets currently contain data on NBA players and their season stats. It also contains biographical information and the records of their teams. </a:t>
-            </a:r>
-            <a:endParaRPr/>
-          </a:p>
-          <a:p>
-            <a:pPr marL="0" lvl="0" indent="0" algn="l" rtl="0">
-              <a:spcBef>
-                <a:spcPts val="1200"/>
-              </a:spcBef>
-              <a:spcAft>
-                <a:spcPts val="0"/>
-              </a:spcAft>
-              <a:buNone/>
-            </a:pPr>
-            <a:r>
-              <a:rPr lang="en"/>
-              <a:t>-</a:t>
-            </a:r>
-            <a:r>
-              <a:rPr lang="en" u="sng">
-                <a:solidFill>
-                  <a:schemeClr val="hlink"/>
-                </a:solidFill>
-                <a:hlinkClick r:id="rId3"/>
-              </a:rPr>
-              <a:t>https://www.kaggle.com/whitefero/nba-player-salary-19902017</a:t>
-            </a:r>
-            <a:endParaRPr/>
-          </a:p>
-          <a:p>
-            <a:pPr marL="0" lvl="0" indent="0" algn="l" rtl="0">
-              <a:spcBef>
-                <a:spcPts val="1200"/>
-              </a:spcBef>
-              <a:spcAft>
-                <a:spcPts val="0"/>
-              </a:spcAft>
-              <a:buNone/>
-            </a:pPr>
-            <a:r>
-              <a:rPr lang="en"/>
-              <a:t>-</a:t>
-            </a:r>
-            <a:r>
-              <a:rPr lang="en" u="sng">
-                <a:solidFill>
-                  <a:schemeClr val="hlink"/>
-                </a:solidFill>
-                <a:hlinkClick r:id="rId4"/>
-              </a:rPr>
-              <a:t>https://www.kaggle.com/drgilermo/nba-players-stats</a:t>
-            </a:r>
-            <a:endParaRPr/>
-          </a:p>
-          <a:p>
-            <a:pPr marL="0" lvl="0" indent="0" algn="l" rtl="0">
-              <a:spcBef>
-                <a:spcPts val="1200"/>
-              </a:spcBef>
-              <a:spcAft>
-                <a:spcPts val="0"/>
-              </a:spcAft>
-              <a:buNone/>
-            </a:pPr>
-            <a:r>
-              <a:rPr lang="en"/>
-              <a:t>-</a:t>
-            </a:r>
-            <a:r>
-              <a:rPr lang="en" u="sng">
-                <a:solidFill>
-                  <a:schemeClr val="hlink"/>
-                </a:solidFill>
-                <a:hlinkClick r:id="rId5"/>
-              </a:rPr>
-              <a:t>https://data.world/gmoney/nba-team-records-by-year</a:t>
-            </a:r>
-            <a:endParaRPr/>
-          </a:p>
-          <a:p>
-            <a:pPr marL="0" lvl="0" indent="0" algn="l" rtl="0">
-              <a:spcBef>
-                <a:spcPts val="1200"/>
-              </a:spcBef>
-              <a:spcAft>
-                <a:spcPts val="1200"/>
-              </a:spcAft>
-              <a:buNone/>
-            </a:pPr>
-            <a:endParaRPr/>
+            <a:pPr algn="ctr"/>
+            <a:endParaRPr lang="en-US"/>
           </a:p>
         </p:txBody>
       </p:sp>
     </p:spTree>
+    <p:extLst>
+      <p:ext uri="{BB962C8B-B14F-4D97-AF65-F5344CB8AC3E}">
+        <p14:creationId xmlns:p14="http://schemas.microsoft.com/office/powerpoint/2010/main" val="3655196771"/>
+      </p:ext>
+    </p:extLst>
   </p:cSld>
   <p:clrMapOvr>
     <a:masterClrMapping/>
@@ -10137,8 +10358,8 @@
         </p:nvSpPr>
         <p:spPr>
           <a:xfrm>
-            <a:off x="1297500" y="393750"/>
-            <a:ext cx="7038900" cy="914100"/>
+            <a:off x="1108814" y="611464"/>
+            <a:ext cx="7038900" cy="636764"/>
           </a:xfrm>
           <a:prstGeom prst="rect">
             <a:avLst/>
@@ -10202,10 +10423,22 @@
               <a:buNone/>
             </a:pPr>
             <a:r>
-              <a:rPr lang="en"/>
-              <a:t>We are looking to answer how much a player should be paid with the amount of on court statistical production they provide in the major categories. Points, rebounds, assists, steals, blocks, three pointers made, field goal percentage, three point percentage, team record and turnovers are all considered. </a:t>
+              <a:rPr lang="en" dirty="0"/>
+              <a:t>We are looking to answer how much a player should be paid with the amount of on court statistical production they provide in the major categories. </a:t>
             </a:r>
-            <a:endParaRPr/>
+            <a:endParaRPr lang="en" dirty="0" smtClean="0"/>
+          </a:p>
+          <a:p>
+            <a:pPr marL="285750" indent="-285750"/>
+            <a:r>
+              <a:rPr lang="en" dirty="0" smtClean="0"/>
+              <a:t>Points</a:t>
+            </a:r>
+            <a:r>
+              <a:rPr lang="en" dirty="0"/>
+              <a:t>, rebounds, assists, steals, blocks, three pointers made, field goal percentage, three point percentage, team record and turnovers are all considered. </a:t>
+            </a:r>
+            <a:endParaRPr dirty="0"/>
           </a:p>
           <a:p>
             <a:pPr marL="0" lvl="0" indent="0" algn="l" rtl="0">
@@ -10218,10 +10451,10 @@
               <a:buNone/>
             </a:pPr>
             <a:r>
-              <a:rPr lang="en"/>
+              <a:rPr lang="en" dirty="0"/>
               <a:t>The datasets that we found provide salary from the 1990-2017 seasons, which is when the league’s players experienced a massive increase to their salary from the new Collective Bargaining Agreement in 2017.</a:t>
             </a:r>
-            <a:endParaRPr/>
+            <a:endParaRPr dirty="0"/>
           </a:p>
         </p:txBody>
       </p:sp>
@@ -10238,7 +10471,7 @@
   <p:cSld>
     <p:spTree>
       <p:nvGrpSpPr>
-        <p:cNvPr id="1" name="Shape 164"/>
+        <p:cNvPr id="1" name="Shape 152"/>
         <p:cNvGrpSpPr/>
         <p:nvPr/>
       </p:nvGrpSpPr>
@@ -10252,7 +10485,7 @@
       </p:grpSpPr>
       <p:sp>
         <p:nvSpPr>
-          <p:cNvPr id="165" name="Google Shape;165;p18"/>
+          <p:cNvPr id="153" name="Google Shape;153;p16"/>
           <p:cNvSpPr txBox="1">
             <a:spLocks noGrp="1"/>
           </p:cNvSpPr>
@@ -10262,7 +10495,7 @@
         </p:nvSpPr>
         <p:spPr>
           <a:xfrm>
-            <a:off x="1297500" y="393750"/>
+            <a:off x="1195900" y="0"/>
             <a:ext cx="7038900" cy="914100"/>
           </a:xfrm>
           <a:prstGeom prst="rect">
@@ -10275,17 +10508,26 @@
           </a:bodyPr>
           <a:lstStyle/>
           <a:p>
+            <a:pPr marL="0" lvl="0" indent="0" algn="ctr" rtl="0">
+              <a:spcBef>
+                <a:spcPts val="0"/>
+              </a:spcBef>
+              <a:spcAft>
+                <a:spcPts val="0"/>
+              </a:spcAft>
+              <a:buNone/>
+            </a:pPr>
             <a:r>
-              <a:rPr lang="en-US" dirty="0" smtClean="0"/>
-              <a:t>Hypothesis</a:t>
+              <a:rPr lang="en" dirty="0"/>
+              <a:t>Source of Data</a:t>
             </a:r>
-            <a:endParaRPr lang="en-US" dirty="0"/>
+            <a:endParaRPr dirty="0"/>
           </a:p>
         </p:txBody>
       </p:sp>
       <p:sp>
         <p:nvSpPr>
-          <p:cNvPr id="166" name="Google Shape;166;p18"/>
+          <p:cNvPr id="154" name="Google Shape;154;p16"/>
           <p:cNvSpPr txBox="1">
             <a:spLocks noGrp="1"/>
           </p:cNvSpPr>
@@ -10295,8 +10537,8 @@
         </p:nvSpPr>
         <p:spPr>
           <a:xfrm>
-            <a:off x="1297500" y="1567550"/>
-            <a:ext cx="7038900" cy="2911200"/>
+            <a:off x="484435" y="3889828"/>
+            <a:ext cx="8665029" cy="3468908"/>
           </a:xfrm>
           <a:prstGeom prst="rect">
             <a:avLst/>
@@ -10308,21 +10550,440 @@
           </a:bodyPr>
           <a:lstStyle/>
           <a:p>
-            <a:pPr marL="146050" indent="0">
+            <a:pPr marL="0" lvl="0" indent="0" algn="ctr" rtl="0">
+              <a:spcBef>
+                <a:spcPts val="1200"/>
+              </a:spcBef>
+              <a:spcAft>
+                <a:spcPts val="0"/>
+              </a:spcAft>
               <a:buNone/>
             </a:pPr>
             <a:r>
-              <a:rPr lang="en-US" dirty="0"/>
-              <a:t>The statistics mentioned </a:t>
+              <a:rPr lang="en" u="sng" dirty="0" smtClean="0">
+                <a:solidFill>
+                  <a:schemeClr val="hlink"/>
+                </a:solidFill>
+                <a:hlinkClick r:id="rId3"/>
+              </a:rPr>
+              <a:t>https</a:t>
             </a:r>
             <a:r>
-              <a:rPr lang="en-US" dirty="0" smtClean="0"/>
-              <a:t>before </a:t>
+              <a:rPr lang="en" u="sng" dirty="0">
+                <a:solidFill>
+                  <a:schemeClr val="hlink"/>
+                </a:solidFill>
+                <a:hlinkClick r:id="rId3"/>
+              </a:rPr>
+              <a:t>://www.kaggle.com/whitefero/nba-player-salary-19902017</a:t>
+            </a:r>
+            <a:endParaRPr dirty="0"/>
+          </a:p>
+          <a:p>
+            <a:pPr marL="0" lvl="0" indent="0" algn="ctr" rtl="0">
+              <a:spcBef>
+                <a:spcPts val="1200"/>
+              </a:spcBef>
+              <a:spcAft>
+                <a:spcPts val="0"/>
+              </a:spcAft>
+              <a:buNone/>
+            </a:pPr>
+            <a:r>
+              <a:rPr lang="en" u="sng" dirty="0" smtClean="0">
+                <a:solidFill>
+                  <a:schemeClr val="hlink"/>
+                </a:solidFill>
+                <a:hlinkClick r:id="rId4"/>
+              </a:rPr>
+              <a:t>https</a:t>
             </a:r>
             <a:r>
-              <a:rPr lang="en-US" dirty="0"/>
-              <a:t>will be consider the ‘features’ of our Machine Learning Model. The salary will be the ‘output’. The question we will be hoping to answer is: “Can we predict a player’s salary based on their NBA statistics?”</a:t>
+              <a:rPr lang="en" u="sng" dirty="0">
+                <a:solidFill>
+                  <a:schemeClr val="hlink"/>
+                </a:solidFill>
+                <a:hlinkClick r:id="rId4"/>
+              </a:rPr>
+              <a:t>://www.kaggle.com/drgilermo/nba-players-stats</a:t>
             </a:r>
+            <a:endParaRPr dirty="0"/>
+          </a:p>
+          <a:p>
+            <a:pPr marL="0" lvl="0" indent="0" algn="ctr" rtl="0">
+              <a:spcBef>
+                <a:spcPts val="1200"/>
+              </a:spcBef>
+              <a:spcAft>
+                <a:spcPts val="0"/>
+              </a:spcAft>
+              <a:buNone/>
+            </a:pPr>
+            <a:r>
+              <a:rPr lang="en" u="sng" dirty="0" smtClean="0">
+                <a:solidFill>
+                  <a:schemeClr val="hlink"/>
+                </a:solidFill>
+                <a:hlinkClick r:id="rId5"/>
+              </a:rPr>
+              <a:t>https</a:t>
+            </a:r>
+            <a:r>
+              <a:rPr lang="en" u="sng" dirty="0">
+                <a:solidFill>
+                  <a:schemeClr val="hlink"/>
+                </a:solidFill>
+                <a:hlinkClick r:id="rId5"/>
+              </a:rPr>
+              <a:t>://data.world/gmoney/nba-team-records-by-year</a:t>
+            </a:r>
+            <a:endParaRPr dirty="0"/>
+          </a:p>
+          <a:p>
+            <a:pPr marL="0" lvl="0" indent="0" algn="ctr" rtl="0">
+              <a:spcBef>
+                <a:spcPts val="1200"/>
+              </a:spcBef>
+              <a:spcAft>
+                <a:spcPts val="1200"/>
+              </a:spcAft>
+              <a:buNone/>
+            </a:pPr>
+            <a:endParaRPr dirty="0"/>
+          </a:p>
+        </p:txBody>
+      </p:sp>
+      <p:pic>
+        <p:nvPicPr>
+          <p:cNvPr id="4" name="Picture 3"/>
+          <p:cNvPicPr>
+            <a:picLocks noChangeAspect="1"/>
+          </p:cNvPicPr>
+          <p:nvPr/>
+        </p:nvPicPr>
+        <p:blipFill rotWithShape="1">
+          <a:blip r:embed="rId6">
+            <a:extLst>
+              <a:ext uri="{28A0092B-C50C-407E-A947-70E740481C1C}">
+                <a14:useLocalDpi xmlns:a14="http://schemas.microsoft.com/office/drawing/2010/main" val="0"/>
+              </a:ext>
+            </a:extLst>
+          </a:blip>
+          <a:srcRect b="62056"/>
+          <a:stretch/>
+        </p:blipFill>
+        <p:spPr>
+          <a:xfrm>
+            <a:off x="1297500" y="471870"/>
+            <a:ext cx="7038900" cy="3654931"/>
+          </a:xfrm>
+          <a:prstGeom prst="rect">
+            <a:avLst/>
+          </a:prstGeom>
+        </p:spPr>
+      </p:pic>
+      <p:sp>
+        <p:nvSpPr>
+          <p:cNvPr id="5" name="Google Shape;154;p16"/>
+          <p:cNvSpPr txBox="1">
+            <a:spLocks/>
+          </p:cNvSpPr>
+          <p:nvPr/>
+        </p:nvSpPr>
+        <p:spPr>
+          <a:xfrm>
+            <a:off x="1297500" y="647145"/>
+            <a:ext cx="1779528" cy="1342569"/>
+          </a:xfrm>
+          <a:prstGeom prst="rect">
+            <a:avLst/>
+          </a:prstGeom>
+          <a:noFill/>
+          <a:ln>
+            <a:noFill/>
+          </a:ln>
+        </p:spPr>
+        <p:txBody>
+          <a:bodyPr spcFirstLastPara="1" wrap="square" lIns="91425" tIns="91425" rIns="91425" bIns="91425" anchor="t" anchorCtr="0">
+            <a:normAutofit fontScale="85000" lnSpcReduction="20000"/>
+          </a:bodyPr>
+          <a:lstStyle>
+            <a:defPPr marR="0" lvl="0" algn="l" rtl="0">
+              <a:lnSpc>
+                <a:spcPct val="100000"/>
+              </a:lnSpc>
+              <a:spcBef>
+                <a:spcPts val="0"/>
+              </a:spcBef>
+              <a:spcAft>
+                <a:spcPts val="0"/>
+              </a:spcAft>
+            </a:defPPr>
+            <a:lvl1pPr marL="457200" marR="0" lvl="0" indent="-311150" algn="l" rtl="0">
+              <a:lnSpc>
+                <a:spcPct val="115000"/>
+              </a:lnSpc>
+              <a:spcBef>
+                <a:spcPts val="0"/>
+              </a:spcBef>
+              <a:spcAft>
+                <a:spcPts val="0"/>
+              </a:spcAft>
+              <a:buClr>
+                <a:schemeClr val="lt1"/>
+              </a:buClr>
+              <a:buSzPts val="1300"/>
+              <a:buFont typeface="Lato"/>
+              <a:buChar char="●"/>
+              <a:defRPr sz="1300" b="0" i="0" u="none" strike="noStrike" cap="none">
+                <a:solidFill>
+                  <a:schemeClr val="lt1"/>
+                </a:solidFill>
+                <a:latin typeface="Lato"/>
+                <a:ea typeface="Lato"/>
+                <a:cs typeface="Lato"/>
+                <a:sym typeface="Lato"/>
+              </a:defRPr>
+            </a:lvl1pPr>
+            <a:lvl2pPr marL="914400" marR="0" lvl="1" indent="-298450" algn="l" rtl="0">
+              <a:lnSpc>
+                <a:spcPct val="115000"/>
+              </a:lnSpc>
+              <a:spcBef>
+                <a:spcPts val="0"/>
+              </a:spcBef>
+              <a:spcAft>
+                <a:spcPts val="0"/>
+              </a:spcAft>
+              <a:buClr>
+                <a:schemeClr val="lt1"/>
+              </a:buClr>
+              <a:buSzPts val="1100"/>
+              <a:buFont typeface="Lato"/>
+              <a:buChar char="○"/>
+              <a:defRPr sz="1100" b="0" i="0" u="none" strike="noStrike" cap="none">
+                <a:solidFill>
+                  <a:schemeClr val="lt1"/>
+                </a:solidFill>
+                <a:latin typeface="Lato"/>
+                <a:ea typeface="Lato"/>
+                <a:cs typeface="Lato"/>
+                <a:sym typeface="Lato"/>
+              </a:defRPr>
+            </a:lvl2pPr>
+            <a:lvl3pPr marL="1371600" marR="0" lvl="2" indent="-298450" algn="l" rtl="0">
+              <a:lnSpc>
+                <a:spcPct val="115000"/>
+              </a:lnSpc>
+              <a:spcBef>
+                <a:spcPts val="0"/>
+              </a:spcBef>
+              <a:spcAft>
+                <a:spcPts val="0"/>
+              </a:spcAft>
+              <a:buClr>
+                <a:schemeClr val="lt1"/>
+              </a:buClr>
+              <a:buSzPts val="1100"/>
+              <a:buFont typeface="Lato"/>
+              <a:buChar char="■"/>
+              <a:defRPr sz="1100" b="0" i="0" u="none" strike="noStrike" cap="none">
+                <a:solidFill>
+                  <a:schemeClr val="lt1"/>
+                </a:solidFill>
+                <a:latin typeface="Lato"/>
+                <a:ea typeface="Lato"/>
+                <a:cs typeface="Lato"/>
+                <a:sym typeface="Lato"/>
+              </a:defRPr>
+            </a:lvl3pPr>
+            <a:lvl4pPr marL="1828800" marR="0" lvl="3" indent="-298450" algn="l" rtl="0">
+              <a:lnSpc>
+                <a:spcPct val="115000"/>
+              </a:lnSpc>
+              <a:spcBef>
+                <a:spcPts val="0"/>
+              </a:spcBef>
+              <a:spcAft>
+                <a:spcPts val="0"/>
+              </a:spcAft>
+              <a:buClr>
+                <a:schemeClr val="lt1"/>
+              </a:buClr>
+              <a:buSzPts val="1100"/>
+              <a:buFont typeface="Lato"/>
+              <a:buChar char="●"/>
+              <a:defRPr sz="1100" b="0" i="0" u="none" strike="noStrike" cap="none">
+                <a:solidFill>
+                  <a:schemeClr val="lt1"/>
+                </a:solidFill>
+                <a:latin typeface="Lato"/>
+                <a:ea typeface="Lato"/>
+                <a:cs typeface="Lato"/>
+                <a:sym typeface="Lato"/>
+              </a:defRPr>
+            </a:lvl4pPr>
+            <a:lvl5pPr marL="2286000" marR="0" lvl="4" indent="-298450" algn="l" rtl="0">
+              <a:lnSpc>
+                <a:spcPct val="115000"/>
+              </a:lnSpc>
+              <a:spcBef>
+                <a:spcPts val="0"/>
+              </a:spcBef>
+              <a:spcAft>
+                <a:spcPts val="0"/>
+              </a:spcAft>
+              <a:buClr>
+                <a:schemeClr val="lt1"/>
+              </a:buClr>
+              <a:buSzPts val="1100"/>
+              <a:buFont typeface="Lato"/>
+              <a:buChar char="○"/>
+              <a:defRPr sz="1100" b="0" i="0" u="none" strike="noStrike" cap="none">
+                <a:solidFill>
+                  <a:schemeClr val="lt1"/>
+                </a:solidFill>
+                <a:latin typeface="Lato"/>
+                <a:ea typeface="Lato"/>
+                <a:cs typeface="Lato"/>
+                <a:sym typeface="Lato"/>
+              </a:defRPr>
+            </a:lvl5pPr>
+            <a:lvl6pPr marL="2743200" marR="0" lvl="5" indent="-298450" algn="l" rtl="0">
+              <a:lnSpc>
+                <a:spcPct val="115000"/>
+              </a:lnSpc>
+              <a:spcBef>
+                <a:spcPts val="0"/>
+              </a:spcBef>
+              <a:spcAft>
+                <a:spcPts val="0"/>
+              </a:spcAft>
+              <a:buClr>
+                <a:schemeClr val="lt1"/>
+              </a:buClr>
+              <a:buSzPts val="1100"/>
+              <a:buFont typeface="Lato"/>
+              <a:buChar char="■"/>
+              <a:defRPr sz="1100" b="0" i="0" u="none" strike="noStrike" cap="none">
+                <a:solidFill>
+                  <a:schemeClr val="lt1"/>
+                </a:solidFill>
+                <a:latin typeface="Lato"/>
+                <a:ea typeface="Lato"/>
+                <a:cs typeface="Lato"/>
+                <a:sym typeface="Lato"/>
+              </a:defRPr>
+            </a:lvl6pPr>
+            <a:lvl7pPr marL="3200400" marR="0" lvl="6" indent="-298450" algn="l" rtl="0">
+              <a:lnSpc>
+                <a:spcPct val="115000"/>
+              </a:lnSpc>
+              <a:spcBef>
+                <a:spcPts val="0"/>
+              </a:spcBef>
+              <a:spcAft>
+                <a:spcPts val="0"/>
+              </a:spcAft>
+              <a:buClr>
+                <a:schemeClr val="lt1"/>
+              </a:buClr>
+              <a:buSzPts val="1100"/>
+              <a:buFont typeface="Lato"/>
+              <a:buChar char="●"/>
+              <a:defRPr sz="1100" b="0" i="0" u="none" strike="noStrike" cap="none">
+                <a:solidFill>
+                  <a:schemeClr val="lt1"/>
+                </a:solidFill>
+                <a:latin typeface="Lato"/>
+                <a:ea typeface="Lato"/>
+                <a:cs typeface="Lato"/>
+                <a:sym typeface="Lato"/>
+              </a:defRPr>
+            </a:lvl7pPr>
+            <a:lvl8pPr marL="3657600" marR="0" lvl="7" indent="-298450" algn="l" rtl="0">
+              <a:lnSpc>
+                <a:spcPct val="115000"/>
+              </a:lnSpc>
+              <a:spcBef>
+                <a:spcPts val="0"/>
+              </a:spcBef>
+              <a:spcAft>
+                <a:spcPts val="0"/>
+              </a:spcAft>
+              <a:buClr>
+                <a:schemeClr val="lt1"/>
+              </a:buClr>
+              <a:buSzPts val="1100"/>
+              <a:buFont typeface="Lato"/>
+              <a:buChar char="○"/>
+              <a:defRPr sz="1100" b="0" i="0" u="none" strike="noStrike" cap="none">
+                <a:solidFill>
+                  <a:schemeClr val="lt1"/>
+                </a:solidFill>
+                <a:latin typeface="Lato"/>
+                <a:ea typeface="Lato"/>
+                <a:cs typeface="Lato"/>
+                <a:sym typeface="Lato"/>
+              </a:defRPr>
+            </a:lvl8pPr>
+            <a:lvl9pPr marL="4114800" marR="0" lvl="8" indent="-298450" algn="l" rtl="0">
+              <a:lnSpc>
+                <a:spcPct val="115000"/>
+              </a:lnSpc>
+              <a:spcBef>
+                <a:spcPts val="0"/>
+              </a:spcBef>
+              <a:spcAft>
+                <a:spcPts val="0"/>
+              </a:spcAft>
+              <a:buClr>
+                <a:schemeClr val="lt1"/>
+              </a:buClr>
+              <a:buSzPts val="1100"/>
+              <a:buFont typeface="Lato"/>
+              <a:buChar char="■"/>
+              <a:defRPr sz="1100" b="0" i="0" u="none" strike="noStrike" cap="none">
+                <a:solidFill>
+                  <a:schemeClr val="lt1"/>
+                </a:solidFill>
+                <a:latin typeface="Lato"/>
+                <a:ea typeface="Lato"/>
+                <a:cs typeface="Lato"/>
+                <a:sym typeface="Lato"/>
+              </a:defRPr>
+            </a:lvl9pPr>
+          </a:lstStyle>
+          <a:p>
+            <a:pPr marL="0" indent="0">
+              <a:buFont typeface="Lato"/>
+              <a:buNone/>
+            </a:pPr>
+            <a:r>
+              <a:rPr lang="en-US" dirty="0" smtClean="0">
+                <a:solidFill>
+                  <a:schemeClr val="tx1"/>
+                </a:solidFill>
+              </a:rPr>
+              <a:t>Our datasets currently contain data on NBA players and their season stats. It also contains biographical information and the records of their teams. </a:t>
+            </a:r>
+          </a:p>
+          <a:p>
+            <a:pPr marL="0" indent="0">
+              <a:spcBef>
+                <a:spcPts val="1200"/>
+              </a:spcBef>
+              <a:spcAft>
+                <a:spcPts val="1200"/>
+              </a:spcAft>
+              <a:buFont typeface="Lato"/>
+              <a:buNone/>
+            </a:pPr>
+            <a:endParaRPr lang="en-US" dirty="0">
+              <a:solidFill>
+                <a:schemeClr val="tx1"/>
+              </a:solidFill>
+            </a:endParaRPr>
           </a:p>
         </p:txBody>
       </p:sp>
@@ -10370,19 +11031,18 @@
         <p:spPr/>
         <p:txBody>
           <a:bodyPr>
-            <a:normAutofit/>
+            <a:normAutofit fontScale="90000"/>
           </a:bodyPr>
           <a:lstStyle/>
           <a:p>
             <a:pPr algn="ctr"/>
             <a:r>
-              <a:rPr lang="en-US" dirty="0" smtClean="0"/>
-              <a:t>D</a:t>
+              <a:rPr lang="en-US" dirty="0"/>
+              <a:t>Description of the data exploration phase of the project</a:t>
             </a:r>
-            <a:r>
-              <a:rPr lang="en-US" dirty="0" smtClean="0"/>
-              <a:t>ata Exploration/Analysis</a:t>
-            </a:r>
+            <a:br>
+              <a:rPr lang="en-US" dirty="0"/>
+            </a:br>
             <a:endParaRPr lang="en-CA" dirty="0"/>
           </a:p>
         </p:txBody>
@@ -10405,7 +11065,7 @@
         </p:nvSpPr>
         <p:spPr>
           <a:xfrm>
-            <a:off x="1297500" y="1073564"/>
+            <a:off x="1297500" y="1307850"/>
             <a:ext cx="7038900" cy="2911200"/>
           </a:xfrm>
         </p:spPr>
@@ -10449,8 +11109,13 @@
             <a:pPr lvl="1"/>
             <a:r>
               <a:rPr lang="en-CA" dirty="0" smtClean="0"/>
-              <a:t>Joined tables based on player names and year to join their player stats, salaries, and team stats (add image of ERD later)</a:t>
+              <a:t>Joined tables based on player names and year to join their player stats, salaries, and team </a:t>
             </a:r>
+            <a:r>
+              <a:rPr lang="en-CA" dirty="0" smtClean="0"/>
+              <a:t>stats</a:t>
+            </a:r>
+            <a:endParaRPr lang="en-CA" dirty="0" smtClean="0"/>
           </a:p>
           <a:p>
             <a:pPr lvl="1"/>
@@ -10522,7 +11187,12 @@
             <p:ph type="title"/>
           </p:nvPr>
         </p:nvSpPr>
-        <p:spPr/>
+        <p:spPr>
+          <a:xfrm>
+            <a:off x="1297500" y="408265"/>
+            <a:ext cx="7038900" cy="914100"/>
+          </a:xfrm>
+        </p:spPr>
         <p:txBody>
           <a:bodyPr/>
           <a:lstStyle/>
@@ -10562,29 +11232,380 @@
             <a:endParaRPr lang="en-US" dirty="0" smtClean="0"/>
           </a:p>
           <a:p>
+            <a:endParaRPr lang="en-US" dirty="0" smtClean="0"/>
+          </a:p>
+          <a:p>
             <a:r>
               <a:rPr lang="en-US" dirty="0" smtClean="0"/>
               <a:t>SQL was used to join raw csv/datasets into one table </a:t>
             </a:r>
           </a:p>
           <a:p>
-            <a:r>
-              <a:rPr lang="en-US" dirty="0" smtClean="0"/>
-              <a:t>Python/Pandas was used to load in and clean data</a:t>
-            </a:r>
+            <a:endParaRPr lang="en-US" dirty="0" smtClean="0"/>
           </a:p>
           <a:p>
             <a:r>
               <a:rPr lang="en-US" dirty="0" smtClean="0"/>
-              <a:t>Python/Pandas was also used for Machine Learning</a:t>
+              <a:t>Python/Pandas </a:t>
+            </a:r>
+            <a:r>
+              <a:rPr lang="en-US" dirty="0" smtClean="0"/>
+              <a:t>was used to load in and clean data</a:t>
+            </a:r>
+          </a:p>
+          <a:p>
+            <a:endParaRPr lang="en-US" dirty="0" smtClean="0"/>
+          </a:p>
+          <a:p>
+            <a:r>
+              <a:rPr lang="en-US" dirty="0" smtClean="0"/>
+              <a:t>Python/Pandas </a:t>
+            </a:r>
+            <a:r>
+              <a:rPr lang="en-US" dirty="0" smtClean="0"/>
+              <a:t>was also used for Machine Learning</a:t>
             </a:r>
           </a:p>
         </p:txBody>
       </p:sp>
+      <p:pic>
+        <p:nvPicPr>
+          <p:cNvPr id="3078" name="Picture 6" descr="Microsoft Excel | Cambrian College Teaching &amp;amp; Learning Innovation Hub"/>
+          <p:cNvPicPr>
+            <a:picLocks noChangeAspect="1" noChangeArrowheads="1"/>
+          </p:cNvPicPr>
+          <p:nvPr/>
+        </p:nvPicPr>
+        <p:blipFill rotWithShape="1">
+          <a:blip r:embed="rId2">
+            <a:extLst>
+              <a:ext uri="{28A0092B-C50C-407E-A947-70E740481C1C}">
+                <a14:useLocalDpi xmlns:a14="http://schemas.microsoft.com/office/drawing/2010/main" val="0"/>
+              </a:ext>
+            </a:extLst>
+          </a:blip>
+          <a:srcRect l="30755" t="3505" r="28773" b="2324"/>
+          <a:stretch/>
+        </p:blipFill>
+        <p:spPr bwMode="auto">
+          <a:xfrm>
+            <a:off x="1065464" y="3358704"/>
+            <a:ext cx="1256823" cy="1169754"/>
+          </a:xfrm>
+          <a:prstGeom prst="rect">
+            <a:avLst/>
+          </a:prstGeom>
+          <a:noFill/>
+          <a:extLst>
+            <a:ext uri="{909E8E84-426E-40DD-AFC4-6F175D3DCCD1}">
+              <a14:hiddenFill xmlns:a14="http://schemas.microsoft.com/office/drawing/2010/main">
+                <a:solidFill>
+                  <a:srgbClr val="FFFFFF"/>
+                </a:solidFill>
+              </a14:hiddenFill>
+            </a:ext>
+          </a:extLst>
+        </p:spPr>
+      </p:pic>
+      <p:pic>
+        <p:nvPicPr>
+          <p:cNvPr id="3080" name="Picture 8" descr="Save money and improve agility and scale by modernizing your SQL Server to  Azure SQL | Argon Systems"/>
+          <p:cNvPicPr>
+            <a:picLocks noChangeAspect="1" noChangeArrowheads="1"/>
+          </p:cNvPicPr>
+          <p:nvPr/>
+        </p:nvPicPr>
+        <p:blipFill>
+          <a:blip r:embed="rId3">
+            <a:extLst>
+              <a:ext uri="{28A0092B-C50C-407E-A947-70E740481C1C}">
+                <a14:useLocalDpi xmlns:a14="http://schemas.microsoft.com/office/drawing/2010/main" val="0"/>
+              </a:ext>
+            </a:extLst>
+          </a:blip>
+          <a:srcRect/>
+          <a:stretch>
+            <a:fillRect/>
+          </a:stretch>
+        </p:blipFill>
+        <p:spPr bwMode="auto">
+          <a:xfrm>
+            <a:off x="4037768" y="3352801"/>
+            <a:ext cx="1558363" cy="1169754"/>
+          </a:xfrm>
+          <a:prstGeom prst="rect">
+            <a:avLst/>
+          </a:prstGeom>
+          <a:noFill/>
+          <a:extLst>
+            <a:ext uri="{909E8E84-426E-40DD-AFC4-6F175D3DCCD1}">
+              <a14:hiddenFill xmlns:a14="http://schemas.microsoft.com/office/drawing/2010/main">
+                <a:solidFill>
+                  <a:srgbClr val="FFFFFF"/>
+                </a:solidFill>
+              </a14:hiddenFill>
+            </a:ext>
+          </a:extLst>
+        </p:spPr>
+      </p:pic>
+      <p:pic>
+        <p:nvPicPr>
+          <p:cNvPr id="3084" name="Picture 12" descr="Python - ironFocus"/>
+          <p:cNvPicPr>
+            <a:picLocks noChangeAspect="1" noChangeArrowheads="1"/>
+          </p:cNvPicPr>
+          <p:nvPr/>
+        </p:nvPicPr>
+        <p:blipFill rotWithShape="1">
+          <a:blip r:embed="rId4">
+            <a:extLst>
+              <a:ext uri="{28A0092B-C50C-407E-A947-70E740481C1C}">
+                <a14:useLocalDpi xmlns:a14="http://schemas.microsoft.com/office/drawing/2010/main" val="0"/>
+              </a:ext>
+            </a:extLst>
+          </a:blip>
+          <a:srcRect t="10008" b="13471"/>
+          <a:stretch/>
+        </p:blipFill>
+        <p:spPr bwMode="auto">
+          <a:xfrm>
+            <a:off x="6800019" y="3352801"/>
+            <a:ext cx="1536381" cy="1175657"/>
+          </a:xfrm>
+          <a:prstGeom prst="rect">
+            <a:avLst/>
+          </a:prstGeom>
+          <a:noFill/>
+          <a:extLst>
+            <a:ext uri="{909E8E84-426E-40DD-AFC4-6F175D3DCCD1}">
+              <a14:hiddenFill xmlns:a14="http://schemas.microsoft.com/office/drawing/2010/main">
+                <a:solidFill>
+                  <a:srgbClr val="FFFFFF"/>
+                </a:solidFill>
+              </a14:hiddenFill>
+            </a:ext>
+          </a:extLst>
+        </p:spPr>
+      </p:pic>
     </p:spTree>
     <p:extLst>
       <p:ext uri="{BB962C8B-B14F-4D97-AF65-F5344CB8AC3E}">
         <p14:creationId xmlns:p14="http://schemas.microsoft.com/office/powerpoint/2010/main" val="1431037512"/>
+      </p:ext>
+    </p:extLst>
+  </p:cSld>
+  <p:clrMapOvr>
+    <a:masterClrMapping/>
+  </p:clrMapOvr>
+</p:sld>
+</file>
+
+<file path=ppt/slides/slide9.xml><?xml version="1.0" encoding="utf-8"?>
+<p:sld xmlns:a="http://schemas.openxmlformats.org/drawingml/2006/main" xmlns:r="http://schemas.openxmlformats.org/officeDocument/2006/relationships" xmlns:p="http://schemas.openxmlformats.org/presentationml/2006/main">
+  <p:cSld>
+    <p:spTree>
+      <p:nvGrpSpPr>
+        <p:cNvPr id="1" name=""/>
+        <p:cNvGrpSpPr/>
+        <p:nvPr/>
+      </p:nvGrpSpPr>
+      <p:grpSpPr>
+        <a:xfrm>
+          <a:off x="0" y="0"/>
+          <a:ext cx="0" cy="0"/>
+          <a:chOff x="0" y="0"/>
+          <a:chExt cx="0" cy="0"/>
+        </a:xfrm>
+      </p:grpSpPr>
+      <p:sp>
+        <p:nvSpPr>
+          <p:cNvPr id="2" name="Title 1"/>
+          <p:cNvSpPr>
+            <a:spLocks noGrp="1"/>
+          </p:cNvSpPr>
+          <p:nvPr>
+            <p:ph type="title"/>
+          </p:nvPr>
+        </p:nvSpPr>
+        <p:spPr>
+          <a:xfrm>
+            <a:off x="1028700" y="79835"/>
+            <a:ext cx="7038900" cy="914100"/>
+          </a:xfrm>
+        </p:spPr>
+        <p:txBody>
+          <a:bodyPr/>
+          <a:lstStyle/>
+          <a:p>
+            <a:r>
+              <a:rPr lang="en-US" dirty="0" smtClean="0"/>
+              <a:t>Findings (to be done for deliverable 4)</a:t>
+            </a:r>
+            <a:endParaRPr lang="en-US" dirty="0"/>
+          </a:p>
+        </p:txBody>
+      </p:sp>
+      <p:sp>
+        <p:nvSpPr>
+          <p:cNvPr id="3" name="Text Placeholder 2"/>
+          <p:cNvSpPr>
+            <a:spLocks noGrp="1"/>
+          </p:cNvSpPr>
+          <p:nvPr>
+            <p:ph type="body" idx="1"/>
+          </p:nvPr>
+        </p:nvSpPr>
+        <p:spPr>
+          <a:xfrm>
+            <a:off x="-467557" y="1468301"/>
+            <a:ext cx="7038900" cy="2911200"/>
+          </a:xfrm>
+        </p:spPr>
+        <p:txBody>
+          <a:bodyPr/>
+          <a:lstStyle/>
+          <a:p>
+            <a:pPr marL="615950" lvl="1" indent="0">
+              <a:buNone/>
+            </a:pPr>
+            <a:r>
+              <a:rPr lang="en-US" dirty="0" smtClean="0"/>
+              <a:t>0.   'Predicted </a:t>
+            </a:r>
+            <a:r>
+              <a:rPr lang="en-US" dirty="0"/>
+              <a:t>0 To 999999',</a:t>
+            </a:r>
+          </a:p>
+          <a:p>
+            <a:pPr marL="844550" lvl="1" indent="-228600">
+              <a:buAutoNum type="arabicPeriod"/>
+            </a:pPr>
+            <a:r>
+              <a:rPr lang="en-US" dirty="0"/>
+              <a:t>'Predicted 1000000 To 1999999',</a:t>
+            </a:r>
+          </a:p>
+          <a:p>
+            <a:pPr marL="844550" lvl="1" indent="-228600">
+              <a:buAutoNum type="arabicPeriod"/>
+            </a:pPr>
+            <a:r>
+              <a:rPr lang="en-US" dirty="0"/>
+              <a:t>'Predicted 2000000 To 2999999',</a:t>
+            </a:r>
+          </a:p>
+          <a:p>
+            <a:pPr marL="844550" lvl="1" indent="-228600">
+              <a:buAutoNum type="arabicPeriod"/>
+            </a:pPr>
+            <a:r>
+              <a:rPr lang="en-US" dirty="0"/>
+              <a:t>'Predicted 3000000 To 4999999',</a:t>
+            </a:r>
+          </a:p>
+          <a:p>
+            <a:pPr marL="844550" lvl="1" indent="-228600">
+              <a:buAutoNum type="arabicPeriod"/>
+            </a:pPr>
+            <a:r>
+              <a:rPr lang="en-US" dirty="0"/>
+              <a:t>'Predicted 5000000 To 9999999',</a:t>
+            </a:r>
+          </a:p>
+          <a:p>
+            <a:pPr marL="844550" lvl="1" indent="-228600">
+              <a:buAutoNum type="arabicPeriod"/>
+            </a:pPr>
+            <a:r>
+              <a:rPr lang="en-US" dirty="0"/>
+              <a:t>'Predicted 10000000 To 14999999',</a:t>
+            </a:r>
+          </a:p>
+          <a:p>
+            <a:pPr marL="844550" lvl="1" indent="-228600">
+              <a:buAutoNum type="arabicPeriod"/>
+            </a:pPr>
+            <a:r>
+              <a:rPr lang="en-US" dirty="0"/>
+              <a:t>'Predicted 15000000 To 19999999',</a:t>
+            </a:r>
+          </a:p>
+          <a:p>
+            <a:pPr marL="844550" lvl="1" indent="-228600">
+              <a:buAutoNum type="arabicPeriod"/>
+            </a:pPr>
+            <a:r>
+              <a:rPr lang="en-US" dirty="0"/>
+              <a:t>'Predicted 20000000 To 24999999',</a:t>
+            </a:r>
+          </a:p>
+          <a:p>
+            <a:pPr marL="844550" lvl="1" indent="-228600">
+              <a:buAutoNum type="arabicPeriod"/>
+            </a:pPr>
+            <a:r>
+              <a:rPr lang="en-US" dirty="0"/>
+              <a:t>'Predicted 25000000 To 39999999']</a:t>
+            </a:r>
+          </a:p>
+          <a:p>
+            <a:endParaRPr lang="en-US" dirty="0"/>
+          </a:p>
+        </p:txBody>
+      </p:sp>
+      <p:pic>
+        <p:nvPicPr>
+          <p:cNvPr id="4" name="Picture 3"/>
+          <p:cNvPicPr>
+            <a:picLocks noChangeAspect="1"/>
+          </p:cNvPicPr>
+          <p:nvPr/>
+        </p:nvPicPr>
+        <p:blipFill>
+          <a:blip r:embed="rId3"/>
+          <a:stretch>
+            <a:fillRect/>
+          </a:stretch>
+        </p:blipFill>
+        <p:spPr>
+          <a:xfrm>
+            <a:off x="2814600" y="1129662"/>
+            <a:ext cx="3467100" cy="2219325"/>
+          </a:xfrm>
+          <a:prstGeom prst="rect">
+            <a:avLst/>
+          </a:prstGeom>
+        </p:spPr>
+      </p:pic>
+      <p:pic>
+        <p:nvPicPr>
+          <p:cNvPr id="5" name="Picture 4"/>
+          <p:cNvPicPr>
+            <a:picLocks noChangeAspect="1"/>
+          </p:cNvPicPr>
+          <p:nvPr/>
+        </p:nvPicPr>
+        <p:blipFill>
+          <a:blip r:embed="rId4"/>
+          <a:stretch>
+            <a:fillRect/>
+          </a:stretch>
+        </p:blipFill>
+        <p:spPr>
+          <a:xfrm>
+            <a:off x="6353100" y="566463"/>
+            <a:ext cx="3429000" cy="4714875"/>
+          </a:xfrm>
+          <a:prstGeom prst="rect">
+            <a:avLst/>
+          </a:prstGeom>
+        </p:spPr>
+      </p:pic>
+    </p:spTree>
+    <p:extLst>
+      <p:ext uri="{BB962C8B-B14F-4D97-AF65-F5344CB8AC3E}">
+        <p14:creationId xmlns:p14="http://schemas.microsoft.com/office/powerpoint/2010/main" val="886290087"/>
       </p:ext>
     </p:extLst>
   </p:cSld>

</xml_diff>